<commit_message>
Pictures describing the results
</commit_message>
<xml_diff>
--- a/Trending Arabic words from Twitter.pptx
+++ b/Trending Arabic words from Twitter.pptx
@@ -111,7 +111,41 @@
       </a:defRPr>
     </a:lvl9pPr>
   </p:defaultTextStyle>
+  <p:extLst>
+    <p:ext uri="{EFAFB233-063F-42B5-8137-9DF3F51BA10A}">
+      <p15:sldGuideLst xmlns:p15="http://schemas.microsoft.com/office/powerpoint/2012/main"/>
+    </p:ext>
+  </p:extLst>
 </p:presentation>
+</file>
+
+<file path=ppt/changesInfos/changesInfo1.xml><?xml version="1.0" encoding="utf-8"?>
+<pc:chgInfo xmlns:a="http://schemas.openxmlformats.org/drawingml/2006/main" xmlns:r="http://schemas.openxmlformats.org/officeDocument/2006/relationships" xmlns:ac="http://schemas.microsoft.com/office/drawing/2013/main/command" xmlns:pc="http://schemas.microsoft.com/office/powerpoint/2013/main/command">
+  <pc:docChgLst>
+    <pc:chgData name="abed algane gharra" userId="d34c6a8f760ac7d2" providerId="LiveId" clId="{D9B2ABCC-CAB4-41B6-B9DB-7CC4A20619F7}"/>
+    <pc:docChg chg="undo custSel modSld">
+      <pc:chgData name="abed algane gharra" userId="d34c6a8f760ac7d2" providerId="LiveId" clId="{D9B2ABCC-CAB4-41B6-B9DB-7CC4A20619F7}" dt="2022-06-11T16:47:40.543" v="1" actId="1076"/>
+      <pc:docMkLst>
+        <pc:docMk/>
+      </pc:docMkLst>
+      <pc:sldChg chg="modSp mod">
+        <pc:chgData name="abed algane gharra" userId="d34c6a8f760ac7d2" providerId="LiveId" clId="{D9B2ABCC-CAB4-41B6-B9DB-7CC4A20619F7}" dt="2022-06-11T16:47:40.543" v="1" actId="1076"/>
+        <pc:sldMkLst>
+          <pc:docMk/>
+          <pc:sldMk cId="2170093544" sldId="261"/>
+        </pc:sldMkLst>
+        <pc:picChg chg="mod">
+          <ac:chgData name="abed algane gharra" userId="d34c6a8f760ac7d2" providerId="LiveId" clId="{D9B2ABCC-CAB4-41B6-B9DB-7CC4A20619F7}" dt="2022-06-11T16:47:40.543" v="1" actId="1076"/>
+          <ac:picMkLst>
+            <pc:docMk/>
+            <pc:sldMk cId="2170093544" sldId="261"/>
+            <ac:picMk id="10" creationId="{28677A79-C44F-4591-8E5D-EBA87FC654EE}"/>
+          </ac:picMkLst>
+        </pc:picChg>
+      </pc:sldChg>
+    </pc:docChg>
+  </pc:docChgLst>
+</pc:chgInfo>
 </file>
 
 <file path=ppt/diagrams/colors1.xml><?xml version="1.0" encoding="utf-8"?>
@@ -6674,7 +6708,7 @@
             <a:fld id="{8E36636D-D922-432D-A958-524484B5923D}" type="datetimeFigureOut">
               <a:rPr lang="en-US" dirty="0"/>
               <a:pPr/>
-              <a:t>5/24/2022</a:t>
+              <a:t>6/11/2022</a:t>
             </a:fld>
             <a:endParaRPr lang="en-US" dirty="0"/>
           </a:p>
@@ -6968,7 +7002,7 @@
           <a:p>
             <a:fld id="{48A87A34-81AB-432B-8DAE-1953F412C126}" type="datetimeFigureOut">
               <a:rPr lang="en-US" dirty="0"/>
-              <a:t>5/24/2022</a:t>
+              <a:t>6/11/2022</a:t>
             </a:fld>
             <a:endParaRPr lang="en-US" dirty="0"/>
           </a:p>
@@ -7155,7 +7189,7 @@
           <a:p>
             <a:fld id="{48A87A34-81AB-432B-8DAE-1953F412C126}" type="datetimeFigureOut">
               <a:rPr lang="en-US" dirty="0"/>
-              <a:t>5/24/2022</a:t>
+              <a:t>6/11/2022</a:t>
             </a:fld>
             <a:endParaRPr lang="en-US" dirty="0"/>
           </a:p>
@@ -7411,7 +7445,7 @@
           <a:p>
             <a:fld id="{48A87A34-81AB-432B-8DAE-1953F412C126}" type="datetimeFigureOut">
               <a:rPr lang="en-US" dirty="0"/>
-              <a:t>5/24/2022</a:t>
+              <a:t>6/11/2022</a:t>
             </a:fld>
             <a:endParaRPr lang="en-US" dirty="0"/>
           </a:p>
@@ -7830,7 +7864,7 @@
           <a:p>
             <a:fld id="{48A87A34-81AB-432B-8DAE-1953F412C126}" type="datetimeFigureOut">
               <a:rPr lang="en-US" dirty="0"/>
-              <a:t>5/24/2022</a:t>
+              <a:t>6/11/2022</a:t>
             </a:fld>
             <a:endParaRPr lang="en-US" dirty="0"/>
           </a:p>
@@ -8362,7 +8396,7 @@
           <a:p>
             <a:fld id="{48A87A34-81AB-432B-8DAE-1953F412C126}" type="datetimeFigureOut">
               <a:rPr lang="en-US" dirty="0"/>
-              <a:t>5/24/2022</a:t>
+              <a:t>6/11/2022</a:t>
             </a:fld>
             <a:endParaRPr lang="en-US" dirty="0"/>
           </a:p>
@@ -9221,7 +9255,7 @@
           <a:p>
             <a:fld id="{48A87A34-81AB-432B-8DAE-1953F412C126}" type="datetimeFigureOut">
               <a:rPr lang="en-US" dirty="0"/>
-              <a:t>5/24/2022</a:t>
+              <a:t>6/11/2022</a:t>
             </a:fld>
             <a:endParaRPr lang="en-US" dirty="0"/>
           </a:p>
@@ -9387,7 +9421,7 @@
             <a:fld id="{8E36636D-D922-432D-A958-524484B5923D}" type="datetimeFigureOut">
               <a:rPr lang="en-US" dirty="0"/>
               <a:pPr/>
-              <a:t>5/24/2022</a:t>
+              <a:t>6/11/2022</a:t>
             </a:fld>
             <a:endParaRPr lang="en-US" dirty="0"/>
           </a:p>
@@ -9568,7 +9602,7 @@
             <a:fld id="{8E36636D-D922-432D-A958-524484B5923D}" type="datetimeFigureOut">
               <a:rPr lang="en-US" dirty="0"/>
               <a:pPr/>
-              <a:t>5/24/2022</a:t>
+              <a:t>6/11/2022</a:t>
             </a:fld>
             <a:endParaRPr lang="en-US" dirty="0"/>
           </a:p>
@@ -9735,7 +9769,7 @@
             <a:fld id="{8E36636D-D922-432D-A958-524484B5923D}" type="datetimeFigureOut">
               <a:rPr lang="en-US" dirty="0"/>
               <a:pPr/>
-              <a:t>5/24/2022</a:t>
+              <a:t>6/11/2022</a:t>
             </a:fld>
             <a:endParaRPr lang="en-US" dirty="0"/>
           </a:p>
@@ -9976,7 +10010,7 @@
             <a:fld id="{8E36636D-D922-432D-A958-524484B5923D}" type="datetimeFigureOut">
               <a:rPr lang="en-US" dirty="0"/>
               <a:pPr/>
-              <a:t>5/24/2022</a:t>
+              <a:t>6/11/2022</a:t>
             </a:fld>
             <a:endParaRPr lang="en-US" dirty="0"/>
           </a:p>
@@ -10209,7 +10243,7 @@
             <a:fld id="{8E36636D-D922-432D-A958-524484B5923D}" type="datetimeFigureOut">
               <a:rPr lang="en-US" dirty="0"/>
               <a:pPr/>
-              <a:t>5/24/2022</a:t>
+              <a:t>6/11/2022</a:t>
             </a:fld>
             <a:endParaRPr lang="en-US" dirty="0"/>
           </a:p>
@@ -10672,7 +10706,7 @@
             <a:fld id="{8E36636D-D922-432D-A958-524484B5923D}" type="datetimeFigureOut">
               <a:rPr lang="en-US" dirty="0"/>
               <a:pPr/>
-              <a:t>5/24/2022</a:t>
+              <a:t>6/11/2022</a:t>
             </a:fld>
             <a:endParaRPr lang="en-US" dirty="0"/>
           </a:p>
@@ -10787,7 +10821,7 @@
             <a:fld id="{8E36636D-D922-432D-A958-524484B5923D}" type="datetimeFigureOut">
               <a:rPr lang="en-US" dirty="0"/>
               <a:pPr/>
-              <a:t>5/24/2022</a:t>
+              <a:t>6/11/2022</a:t>
             </a:fld>
             <a:endParaRPr lang="en-US" dirty="0"/>
           </a:p>
@@ -10879,7 +10913,7 @@
             <a:fld id="{8E36636D-D922-432D-A958-524484B5923D}" type="datetimeFigureOut">
               <a:rPr lang="en-US" dirty="0"/>
               <a:pPr/>
-              <a:t>5/24/2022</a:t>
+              <a:t>6/11/2022</a:t>
             </a:fld>
             <a:endParaRPr lang="en-US" dirty="0"/>
           </a:p>
@@ -11131,7 +11165,7 @@
             <a:fld id="{8E36636D-D922-432D-A958-524484B5923D}" type="datetimeFigureOut">
               <a:rPr lang="en-US" dirty="0"/>
               <a:pPr/>
-              <a:t>5/24/2022</a:t>
+              <a:t>6/11/2022</a:t>
             </a:fld>
             <a:endParaRPr lang="en-US" dirty="0"/>
           </a:p>
@@ -11428,7 +11462,7 @@
             <a:fld id="{8E36636D-D922-432D-A958-524484B5923D}" type="datetimeFigureOut">
               <a:rPr lang="en-US" dirty="0"/>
               <a:pPr/>
-              <a:t>5/24/2022</a:t>
+              <a:t>6/11/2022</a:t>
             </a:fld>
             <a:endParaRPr lang="en-US" dirty="0"/>
           </a:p>
@@ -11659,7 +11693,7 @@
             <a:fld id="{8E36636D-D922-432D-A958-524484B5923D}" type="datetimeFigureOut">
               <a:rPr lang="en-US" dirty="0"/>
               <a:pPr/>
-              <a:t>5/24/2022</a:t>
+              <a:t>6/11/2022</a:t>
             </a:fld>
             <a:endParaRPr lang="en-US" dirty="0"/>
           </a:p>
@@ -13733,6 +13767,15 @@
 </file>
 
 <file path=customXml/item1.xml><?xml version="1.0" encoding="utf-8"?>
+<?mso-contentType ?>
+<FormTemplates xmlns="http://schemas.microsoft.com/sharepoint/v3/contenttype/forms">
+  <Display>DocumentLibraryForm</Display>
+  <Edit>DocumentLibraryForm</Edit>
+  <New>DocumentLibraryForm</New>
+</FormTemplates>
+</file>
+
+<file path=customXml/item2.xml><?xml version="1.0" encoding="utf-8"?>
 <ct:contentTypeSchema xmlns:ct="http://schemas.microsoft.com/office/2006/metadata/contentType" xmlns:ma="http://schemas.microsoft.com/office/2006/metadata/properties/metaAttributes" ct:_="" ma:_="" ma:contentTypeName="Document" ma:contentTypeID="0x01010037A301C3B653FF4982BEB96243E0D4E7" ma:contentTypeVersion="11" ma:contentTypeDescription="Create a new document." ma:contentTypeScope="" ma:versionID="f9a0d3fbb502bc23cc0550c20acaac02">
   <xsd:schema xmlns:xsd="http://www.w3.org/2001/XMLSchema" xmlns:xs="http://www.w3.org/2001/XMLSchema" xmlns:p="http://schemas.microsoft.com/office/2006/metadata/properties" xmlns:ns3="ced0c653-218b-44da-943e-239f6c7c508b" xmlns:ns4="a050a7ee-725c-4abb-a46b-fc17ec6dff43" targetNamespace="http://schemas.microsoft.com/office/2006/metadata/properties" ma:root="true" ma:fieldsID="a64394b3da9714dd4a1e76a6106ea427" ns3:_="" ns4:_="">
     <xsd:import namespace="ced0c653-218b-44da-943e-239f6c7c508b"/>
@@ -13941,15 +13984,6 @@
 </ct:contentTypeSchema>
 </file>
 
-<file path=customXml/item2.xml><?xml version="1.0" encoding="utf-8"?>
-<?mso-contentType ?>
-<FormTemplates xmlns="http://schemas.microsoft.com/sharepoint/v3/contenttype/forms">
-  <Display>DocumentLibraryForm</Display>
-  <Edit>DocumentLibraryForm</Edit>
-  <New>DocumentLibraryForm</New>
-</FormTemplates>
-</file>
-
 <file path=customXml/item3.xml><?xml version="1.0" encoding="utf-8"?>
 <p:properties xmlns:p="http://schemas.microsoft.com/office/2006/metadata/properties" xmlns:xsi="http://www.w3.org/2001/XMLSchema-instance" xmlns:pc="http://schemas.microsoft.com/office/infopath/2007/PartnerControls">
   <documentManagement/>
@@ -13957,6 +13991,14 @@
 </file>
 
 <file path=customXml/itemProps1.xml><?xml version="1.0" encoding="utf-8"?>
+<ds:datastoreItem xmlns:ds="http://schemas.openxmlformats.org/officeDocument/2006/customXml" ds:itemID="{E0A1CA69-A845-4246-8612-0FC202C7CBD2}">
+  <ds:schemaRefs>
+    <ds:schemaRef ds:uri="http://schemas.microsoft.com/sharepoint/v3/contenttype/forms"/>
+  </ds:schemaRefs>
+</ds:datastoreItem>
+</file>
+
+<file path=customXml/itemProps2.xml><?xml version="1.0" encoding="utf-8"?>
 <ds:datastoreItem xmlns:ds="http://schemas.openxmlformats.org/officeDocument/2006/customXml" ds:itemID="{EC977066-87DC-489E-AAC8-D1D8D509B76E}">
   <ds:schemaRefs>
     <ds:schemaRef ds:uri="http://schemas.microsoft.com/office/2006/metadata/contentType"/>
@@ -13971,14 +14013,6 @@
     <ds:schemaRef ds:uri="http://purl.org/dc/elements/1.1/"/>
     <ds:schemaRef ds:uri="http://purl.org/dc/terms/"/>
     <ds:schemaRef ds:uri="http://schemas.microsoft.com/internal/obd"/>
-  </ds:schemaRefs>
-</ds:datastoreItem>
-</file>
-
-<file path=customXml/itemProps2.xml><?xml version="1.0" encoding="utf-8"?>
-<ds:datastoreItem xmlns:ds="http://schemas.openxmlformats.org/officeDocument/2006/customXml" ds:itemID="{E0A1CA69-A845-4246-8612-0FC202C7CBD2}">
-  <ds:schemaRefs>
-    <ds:schemaRef ds:uri="http://schemas.microsoft.com/sharepoint/v3/contenttype/forms"/>
   </ds:schemaRefs>
 </ds:datastoreItem>
 </file>

</xml_diff>